<commit_message>
attaching my slides that can opened by github.com
</commit_message>
<xml_diff>
--- a/Powerpint_presentation.pptx
+++ b/Powerpint_presentation.pptx
@@ -10280,13 +10280,23 @@
               </a:spcAft>
               <a:buSzPct val="100000"/>
             </a:pPr>
-            <a:r>
-              <a:rPr lang="en-GB" altLang="en-US" sz="1800">
-                <a:latin typeface="+mn-lt"/>
-              </a:rPr>
-              <a:t>-</a:t>
-            </a:r>
+            <a:endParaRPr lang="en-GB" altLang="en-US" sz="1800">
+              <a:latin typeface="+mn-lt"/>
+            </a:endParaRPr>
+          </a:p>
+          <a:p>
+            <a:pPr marL="0" indent="0" algn="l">
+              <a:lnSpc>
+                <a:spcPct val="100000"/>
+              </a:lnSpc>
+              <a:spcBef>
+                <a:spcPts val="750"/>
+              </a:spcBef>
+              <a:spcAft>
+                <a:spcPts val="0"/>
+              </a:spcAft>
+              <a:buSzPct val="100000"/>
+            </a:pPr>
             <a:r>
               <a:rPr lang="en-US" altLang="en-GB" sz="2800">
                 <a:latin typeface="+mj-ea"/>
@@ -10443,8 +10453,8 @@
         </p:nvSpPr>
         <p:spPr>
           <a:xfrm>
-            <a:off x="1490343" y="4936560"/>
-            <a:ext cx="2160000" cy="432000"/>
+            <a:off x="645795" y="4417060"/>
+            <a:ext cx="5403850" cy="1708150"/>
           </a:xfrm>
         </p:spPr>
         <p:txBody>
@@ -10453,21 +10463,26 @@
           </a:bodyPr>
           <a:p>
             <a:r>
-              <a:rPr altLang="en-GB">
-                <a:sym typeface="+mn-ea"/>
+              <a:rPr lang="en-US" altLang="en-GB" b="0">
+                <a:hlinkClick r:id="rId4" tooltip="" action="ppaction://hlinkfile">
+                  <a:extLst>
+                    <a:ext uri="{DAF060AB-1E55-43B9-8AAB-6FB025537F2F}">
+                      <wpsdc:hlinkClr xmlns:wpsdc="http://www.wps.cn/officeDocument/2017/drawingmlCustomData" val="0026E5"/>
+                      <wpsdc:folHlinkClr xmlns:wpsdc="http://www.wps.cn/officeDocument/2017/drawingmlCustomData" val="7E1FAD"/>
+                      <wpsdc:hlinkUnderline xmlns:wpsdc="http://www.wps.cn/officeDocument/2017/drawingmlCustomData" val="1"/>
+                    </a:ext>
+                  </a:extLst>
+                </a:hlinkClick>
               </a:rPr>
-              <a:t>* Blog post URL:</a:t>
-            </a:r>
-            <a:endParaRPr lang="en-US" altLang="en-GB"/>
-          </a:p>
-          <a:p>
-            <a:endParaRPr lang="en-GB" altLang="en-US"/>
+              <a:t>https://github.com/jodida01/dsc-phase-1-project-v3/blob/master/student.ipynb</a:t>
+            </a:r>
+            <a:endParaRPr lang="en-US" altLang="en-GB" b="0"/>
           </a:p>
         </p:txBody>
       </p:sp>
     </p:spTree>
     <p:custDataLst>
-      <p:tags r:id="rId4"/>
+      <p:tags r:id="rId5"/>
     </p:custDataLst>
   </p:cSld>
   <p:clrMapOvr>
@@ -10656,15 +10671,13 @@
             </a:lvl1pPr>
           </a:lstStyle>
           <a:p>
-            <a:r>
-              <a:rPr lang="en-GB" altLang="en-US">
-                <a:solidFill>
-                  <a:schemeClr val="tx1"/>
-                </a:solidFill>
-              </a:rPr>
-              <a:t>-</a:t>
-            </a:r>
+            <a:endParaRPr lang="en-GB" altLang="en-US">
+              <a:solidFill>
+                <a:schemeClr val="tx1"/>
+              </a:solidFill>
+            </a:endParaRPr>
+          </a:p>
+          <a:p>
             <a:r>
               <a:rPr lang="en-GB" altLang="en-US" sz="4665">
                 <a:solidFill>
@@ -12025,15 +12038,13 @@
             </a:lvl1pPr>
           </a:lstStyle>
           <a:p>
-            <a:r>
-              <a:rPr lang="en-GB" altLang="en-US" sz="1600">
-                <a:solidFill>
-                  <a:schemeClr val="tx1"/>
-                </a:solidFill>
-              </a:rPr>
-              <a:t>-</a:t>
-            </a:r>
+            <a:endParaRPr lang="en-GB" altLang="en-US" sz="1600">
+              <a:solidFill>
+                <a:schemeClr val="tx1"/>
+              </a:solidFill>
+            </a:endParaRPr>
+          </a:p>
+          <a:p>
             <a:r>
               <a:rPr lang="en-GB" altLang="en-US" sz="2300">
                 <a:solidFill>

</xml_diff>